<commit_message>
Added classes User and AssistMe and some methods to start work with
</commit_message>
<xml_diff>
--- a/docs/MockUps/Mockups v1.0.pptx
+++ b/docs/MockUps/Mockups v1.0.pptx
@@ -127,6 +127,11 @@
       </a:defRPr>
     </a:lvl9pPr>
   </p:defaultTextStyle>
+  <p:extLst>
+    <p:ext uri="{EFAFB233-063F-42B5-8137-9DF3F51BA10A}">
+      <p15:sldGuideLst xmlns:p15="http://schemas.microsoft.com/office/powerpoint/2012/main"/>
+    </p:ext>
+  </p:extLst>
 </p:presentation>
 </file>
 
@@ -279,7 +284,7 @@
           <a:p>
             <a:fld id="{CBD36A34-9EBE-4369-A786-FF4079ED43FB}" type="datetimeFigureOut">
               <a:rPr lang="es-CO" smtClean="0"/>
-              <a:t>10/03/2019</a:t>
+              <a:t>11/03/2019</a:t>
             </a:fld>
             <a:endParaRPr lang="es-CO"/>
           </a:p>
@@ -479,7 +484,7 @@
           <a:p>
             <a:fld id="{CBD36A34-9EBE-4369-A786-FF4079ED43FB}" type="datetimeFigureOut">
               <a:rPr lang="es-CO" smtClean="0"/>
-              <a:t>10/03/2019</a:t>
+              <a:t>11/03/2019</a:t>
             </a:fld>
             <a:endParaRPr lang="es-CO"/>
           </a:p>
@@ -689,7 +694,7 @@
           <a:p>
             <a:fld id="{CBD36A34-9EBE-4369-A786-FF4079ED43FB}" type="datetimeFigureOut">
               <a:rPr lang="es-CO" smtClean="0"/>
-              <a:t>10/03/2019</a:t>
+              <a:t>11/03/2019</a:t>
             </a:fld>
             <a:endParaRPr lang="es-CO"/>
           </a:p>
@@ -889,7 +894,7 @@
           <a:p>
             <a:fld id="{CBD36A34-9EBE-4369-A786-FF4079ED43FB}" type="datetimeFigureOut">
               <a:rPr lang="es-CO" smtClean="0"/>
-              <a:t>10/03/2019</a:t>
+              <a:t>11/03/2019</a:t>
             </a:fld>
             <a:endParaRPr lang="es-CO"/>
           </a:p>
@@ -1165,7 +1170,7 @@
           <a:p>
             <a:fld id="{CBD36A34-9EBE-4369-A786-FF4079ED43FB}" type="datetimeFigureOut">
               <a:rPr lang="es-CO" smtClean="0"/>
-              <a:t>10/03/2019</a:t>
+              <a:t>11/03/2019</a:t>
             </a:fld>
             <a:endParaRPr lang="es-CO"/>
           </a:p>
@@ -1433,7 +1438,7 @@
           <a:p>
             <a:fld id="{CBD36A34-9EBE-4369-A786-FF4079ED43FB}" type="datetimeFigureOut">
               <a:rPr lang="es-CO" smtClean="0"/>
-              <a:t>10/03/2019</a:t>
+              <a:t>11/03/2019</a:t>
             </a:fld>
             <a:endParaRPr lang="es-CO"/>
           </a:p>
@@ -1848,7 +1853,7 @@
           <a:p>
             <a:fld id="{CBD36A34-9EBE-4369-A786-FF4079ED43FB}" type="datetimeFigureOut">
               <a:rPr lang="es-CO" smtClean="0"/>
-              <a:t>10/03/2019</a:t>
+              <a:t>11/03/2019</a:t>
             </a:fld>
             <a:endParaRPr lang="es-CO"/>
           </a:p>
@@ -1990,7 +1995,7 @@
           <a:p>
             <a:fld id="{CBD36A34-9EBE-4369-A786-FF4079ED43FB}" type="datetimeFigureOut">
               <a:rPr lang="es-CO" smtClean="0"/>
-              <a:t>10/03/2019</a:t>
+              <a:t>11/03/2019</a:t>
             </a:fld>
             <a:endParaRPr lang="es-CO"/>
           </a:p>
@@ -2103,7 +2108,7 @@
           <a:p>
             <a:fld id="{CBD36A34-9EBE-4369-A786-FF4079ED43FB}" type="datetimeFigureOut">
               <a:rPr lang="es-CO" smtClean="0"/>
-              <a:t>10/03/2019</a:t>
+              <a:t>11/03/2019</a:t>
             </a:fld>
             <a:endParaRPr lang="es-CO"/>
           </a:p>
@@ -2416,7 +2421,7 @@
           <a:p>
             <a:fld id="{CBD36A34-9EBE-4369-A786-FF4079ED43FB}" type="datetimeFigureOut">
               <a:rPr lang="es-CO" smtClean="0"/>
-              <a:t>10/03/2019</a:t>
+              <a:t>11/03/2019</a:t>
             </a:fld>
             <a:endParaRPr lang="es-CO"/>
           </a:p>
@@ -2705,7 +2710,7 @@
           <a:p>
             <a:fld id="{CBD36A34-9EBE-4369-A786-FF4079ED43FB}" type="datetimeFigureOut">
               <a:rPr lang="es-CO" smtClean="0"/>
-              <a:t>10/03/2019</a:t>
+              <a:t>11/03/2019</a:t>
             </a:fld>
             <a:endParaRPr lang="es-CO"/>
           </a:p>
@@ -2948,7 +2953,7 @@
           <a:p>
             <a:fld id="{CBD36A34-9EBE-4369-A786-FF4079ED43FB}" type="datetimeFigureOut">
               <a:rPr lang="es-CO" smtClean="0"/>
-              <a:t>10/03/2019</a:t>
+              <a:t>11/03/2019</a:t>
             </a:fld>
             <a:endParaRPr lang="es-CO"/>
           </a:p>
@@ -3847,7 +3852,7 @@
         <p:spPr/>
         <p:txBody>
           <a:bodyPr>
-            <a:normAutofit fontScale="92500" lnSpcReduction="20000"/>
+            <a:normAutofit/>
           </a:bodyPr>
           <a:lstStyle/>
           <a:p>
@@ -3858,21 +3863,21 @@
           </a:p>
           <a:p>
             <a:r>
+              <a:rPr lang="es-CO" dirty="0" smtClean="0"/>
+              <a:t>-Administración de sesión de usuario</a:t>
+            </a:r>
+            <a:endParaRPr lang="es-CO" dirty="0"/>
+          </a:p>
+          <a:p>
+            <a:r>
               <a:rPr lang="es-CO" dirty="0"/>
-              <a:t>-Ingreso a la aplicación</a:t>
-            </a:r>
-          </a:p>
-          <a:p>
-            <a:r>
-              <a:rPr lang="es-CO" dirty="0"/>
-              <a:t>-Salida de la aplicación</a:t>
-            </a:r>
-          </a:p>
-          <a:p>
-            <a:r>
-              <a:rPr lang="es-CO" dirty="0"/>
-              <a:t>-Vista del perfil propio y de otros</a:t>
-            </a:r>
+              <a:t>-Vista del perfil propio y de </a:t>
+            </a:r>
+            <a:r>
+              <a:rPr lang="es-CO" dirty="0" smtClean="0"/>
+              <a:t>otros usuarios</a:t>
+            </a:r>
+            <a:endParaRPr lang="es-CO" dirty="0"/>
           </a:p>
         </p:txBody>
       </p:sp>
@@ -4366,7 +4371,7 @@
         <p:spPr>
           <a:xfrm>
             <a:off x="8979999" y="5261113"/>
-            <a:ext cx="3097707" cy="369332"/>
+            <a:ext cx="2905604" cy="369332"/>
           </a:xfrm>
           <a:prstGeom prst="rect">
             <a:avLst/>
@@ -4381,8 +4386,13 @@
           <a:p>
             <a:r>
               <a:rPr lang="es-CO" dirty="0"/>
-              <a:t>Vista de preguntas contestadas</a:t>
-            </a:r>
+              <a:t>Vista de preguntas </a:t>
+            </a:r>
+            <a:r>
+              <a:rPr lang="es-CO" dirty="0" smtClean="0"/>
+              <a:t>realizadas</a:t>
+            </a:r>
+            <a:endParaRPr lang="es-CO" dirty="0"/>
           </a:p>
         </p:txBody>
       </p:sp>

</xml_diff>